<commit_message>
Creation du gantt, finalisation du dossier danalyse
</commit_message>
<xml_diff>
--- a/Documents/Maquette.pptx
+++ b/Documents/Maquette.pptx
@@ -108,6 +108,11 @@
       </a:defRPr>
     </a:lvl9pPr>
   </p:defaultTextStyle>
+  <p:extLst>
+    <p:ext uri="{EFAFB233-063F-42B5-8137-9DF3F51BA10A}">
+      <p15:sldGuideLst xmlns:p15="http://schemas.microsoft.com/office/powerpoint/2012/main"/>
+    </p:ext>
+  </p:extLst>
 </p:presentation>
 </file>
 
@@ -258,7 +263,7 @@
           <a:p>
             <a:fld id="{B5F69165-6F8D-4F15-AAE3-6A9617BFE446}" type="datetimeFigureOut">
               <a:rPr lang="fr-FR" smtClean="0"/>
-              <a:t>09/02/2018</a:t>
+              <a:t>18/02/2018</a:t>
             </a:fld>
             <a:endParaRPr lang="fr-FR"/>
           </a:p>
@@ -456,7 +461,7 @@
           <a:p>
             <a:fld id="{B5F69165-6F8D-4F15-AAE3-6A9617BFE446}" type="datetimeFigureOut">
               <a:rPr lang="fr-FR" smtClean="0"/>
-              <a:t>09/02/2018</a:t>
+              <a:t>18/02/2018</a:t>
             </a:fld>
             <a:endParaRPr lang="fr-FR"/>
           </a:p>
@@ -664,7 +669,7 @@
           <a:p>
             <a:fld id="{B5F69165-6F8D-4F15-AAE3-6A9617BFE446}" type="datetimeFigureOut">
               <a:rPr lang="fr-FR" smtClean="0"/>
-              <a:t>09/02/2018</a:t>
+              <a:t>18/02/2018</a:t>
             </a:fld>
             <a:endParaRPr lang="fr-FR"/>
           </a:p>
@@ -862,7 +867,7 @@
           <a:p>
             <a:fld id="{B5F69165-6F8D-4F15-AAE3-6A9617BFE446}" type="datetimeFigureOut">
               <a:rPr lang="fr-FR" smtClean="0"/>
-              <a:t>09/02/2018</a:t>
+              <a:t>18/02/2018</a:t>
             </a:fld>
             <a:endParaRPr lang="fr-FR"/>
           </a:p>
@@ -1137,7 +1142,7 @@
           <a:p>
             <a:fld id="{B5F69165-6F8D-4F15-AAE3-6A9617BFE446}" type="datetimeFigureOut">
               <a:rPr lang="fr-FR" smtClean="0"/>
-              <a:t>09/02/2018</a:t>
+              <a:t>18/02/2018</a:t>
             </a:fld>
             <a:endParaRPr lang="fr-FR"/>
           </a:p>
@@ -1402,7 +1407,7 @@
           <a:p>
             <a:fld id="{B5F69165-6F8D-4F15-AAE3-6A9617BFE446}" type="datetimeFigureOut">
               <a:rPr lang="fr-FR" smtClean="0"/>
-              <a:t>09/02/2018</a:t>
+              <a:t>18/02/2018</a:t>
             </a:fld>
             <a:endParaRPr lang="fr-FR"/>
           </a:p>
@@ -1814,7 +1819,7 @@
           <a:p>
             <a:fld id="{B5F69165-6F8D-4F15-AAE3-6A9617BFE446}" type="datetimeFigureOut">
               <a:rPr lang="fr-FR" smtClean="0"/>
-              <a:t>09/02/2018</a:t>
+              <a:t>18/02/2018</a:t>
             </a:fld>
             <a:endParaRPr lang="fr-FR"/>
           </a:p>
@@ -1955,7 +1960,7 @@
           <a:p>
             <a:fld id="{B5F69165-6F8D-4F15-AAE3-6A9617BFE446}" type="datetimeFigureOut">
               <a:rPr lang="fr-FR" smtClean="0"/>
-              <a:t>09/02/2018</a:t>
+              <a:t>18/02/2018</a:t>
             </a:fld>
             <a:endParaRPr lang="fr-FR"/>
           </a:p>
@@ -2068,7 +2073,7 @@
           <a:p>
             <a:fld id="{B5F69165-6F8D-4F15-AAE3-6A9617BFE446}" type="datetimeFigureOut">
               <a:rPr lang="fr-FR" smtClean="0"/>
-              <a:t>09/02/2018</a:t>
+              <a:t>18/02/2018</a:t>
             </a:fld>
             <a:endParaRPr lang="fr-FR"/>
           </a:p>
@@ -2379,7 +2384,7 @@
           <a:p>
             <a:fld id="{B5F69165-6F8D-4F15-AAE3-6A9617BFE446}" type="datetimeFigureOut">
               <a:rPr lang="fr-FR" smtClean="0"/>
-              <a:t>09/02/2018</a:t>
+              <a:t>18/02/2018</a:t>
             </a:fld>
             <a:endParaRPr lang="fr-FR"/>
           </a:p>
@@ -2667,7 +2672,7 @@
           <a:p>
             <a:fld id="{B5F69165-6F8D-4F15-AAE3-6A9617BFE446}" type="datetimeFigureOut">
               <a:rPr lang="fr-FR" smtClean="0"/>
-              <a:t>09/02/2018</a:t>
+              <a:t>18/02/2018</a:t>
             </a:fld>
             <a:endParaRPr lang="fr-FR"/>
           </a:p>
@@ -2908,7 +2913,7 @@
           <a:p>
             <a:fld id="{B5F69165-6F8D-4F15-AAE3-6A9617BFE446}" type="datetimeFigureOut">
               <a:rPr lang="fr-FR" smtClean="0"/>
-              <a:t>09/02/2018</a:t>
+              <a:t>18/02/2018</a:t>
             </a:fld>
             <a:endParaRPr lang="fr-FR"/>
           </a:p>
@@ -4384,95 +4389,6 @@
           </a:p>
         </p:txBody>
       </p:sp>
-      <p:sp>
-        <p:nvSpPr>
-          <p:cNvPr id="21" name="Content">
-            <a:extLst>
-              <a:ext uri="{FF2B5EF4-FFF2-40B4-BE49-F238E27FC236}">
-                <a16:creationId xmlns:a16="http://schemas.microsoft.com/office/drawing/2014/main" id="{B6C8DF5C-B856-4B31-A2D2-21D8E10B9CFE}"/>
-              </a:ext>
-            </a:extLst>
-          </p:cNvPr>
-          <p:cNvSpPr/>
-          <p:nvPr>
-            <p:custDataLst>
-              <p:custData r:id="rId7"/>
-            </p:custDataLst>
-          </p:nvPr>
-        </p:nvSpPr>
-        <p:spPr>
-          <a:xfrm>
-            <a:off x="4680734" y="3767607"/>
-            <a:ext cx="2830531" cy="232180"/>
-          </a:xfrm>
-          <a:prstGeom prst="rect">
-            <a:avLst/>
-          </a:prstGeom>
-          <a:solidFill>
-            <a:sysClr val="window" lastClr="FFFFFF"/>
-          </a:solidFill>
-          <a:ln w="3175">
-            <a:solidFill>
-              <a:srgbClr val="000000">
-                <a:lumMod val="50000"/>
-                <a:lumOff val="50000"/>
-              </a:srgbClr>
-            </a:solidFill>
-          </a:ln>
-          <a:effectLst/>
-        </p:spPr>
-        <p:style>
-          <a:lnRef idx="2">
-            <a:srgbClr val="4F81BD">
-              <a:shade val="50000"/>
-            </a:srgbClr>
-          </a:lnRef>
-          <a:fillRef idx="1">
-            <a:srgbClr val="4F81BD"/>
-          </a:fillRef>
-          <a:effectRef idx="0">
-            <a:srgbClr val="4F81BD"/>
-          </a:effectRef>
-          <a:fontRef idx="minor">
-            <a:srgbClr val="000000"/>
-          </a:fontRef>
-        </p:style>
-        <p:txBody>
-          <a:bodyPr wrap="none" lIns="45720" tIns="18288" rIns="45720" bIns="18288" rtlCol="0" anchor="ctr">
-            <a:noAutofit/>
-          </a:bodyPr>
-          <a:lstStyle/>
-          <a:p>
-            <a:r>
-              <a:rPr lang="en-US" sz="1200" dirty="0">
-                <a:solidFill>
-                  <a:srgbClr val="000000"/>
-                </a:solidFill>
-                <a:latin typeface="Segoe UI" pitchFamily="34" charset="0"/>
-                <a:cs typeface="Segoe UI" pitchFamily="34" charset="0"/>
-              </a:rPr>
-              <a:t>Choix de </a:t>
-            </a:r>
-            <a:r>
-              <a:rPr lang="en-US" sz="1200" dirty="0" err="1">
-                <a:solidFill>
-                  <a:srgbClr val="000000"/>
-                </a:solidFill>
-                <a:latin typeface="Segoe UI" pitchFamily="34" charset="0"/>
-                <a:cs typeface="Segoe UI" pitchFamily="34" charset="0"/>
-              </a:rPr>
-              <a:t>l’entrepôt</a:t>
-            </a:r>
-            <a:endParaRPr lang="en-US" sz="1200" dirty="0">
-              <a:solidFill>
-                <a:srgbClr val="000000"/>
-              </a:solidFill>
-              <a:latin typeface="Segoe UI" pitchFamily="34" charset="0"/>
-              <a:cs typeface="Segoe UI" pitchFamily="34" charset="0"/>
-            </a:endParaRPr>
-          </a:p>
-        </p:txBody>
-      </p:sp>
     </p:spTree>
     <p:extLst>
       <p:ext uri="{BB962C8B-B14F-4D97-AF65-F5344CB8AC3E}">
@@ -5734,89 +5650,6 @@
       </p:sp>
       <p:sp>
         <p:nvSpPr>
-          <p:cNvPr id="27" name="Content">
-            <a:extLst>
-              <a:ext uri="{FF2B5EF4-FFF2-40B4-BE49-F238E27FC236}">
-                <a16:creationId xmlns:a16="http://schemas.microsoft.com/office/drawing/2014/main" id="{36A9C9C5-74B1-4C3A-B1DE-3DDD7B7C7EC5}"/>
-              </a:ext>
-            </a:extLst>
-          </p:cNvPr>
-          <p:cNvSpPr/>
-          <p:nvPr>
-            <p:custDataLst>
-              <p:custData r:id="rId10"/>
-            </p:custDataLst>
-          </p:nvPr>
-        </p:nvSpPr>
-        <p:spPr>
-          <a:xfrm>
-            <a:off x="1722900" y="381325"/>
-            <a:ext cx="2830531" cy="232180"/>
-          </a:xfrm>
-          <a:prstGeom prst="rect">
-            <a:avLst/>
-          </a:prstGeom>
-          <a:solidFill>
-            <a:sysClr val="window" lastClr="FFFFFF"/>
-          </a:solidFill>
-          <a:ln w="3175">
-            <a:solidFill>
-              <a:srgbClr val="000000">
-                <a:lumMod val="50000"/>
-                <a:lumOff val="50000"/>
-              </a:srgbClr>
-            </a:solidFill>
-          </a:ln>
-          <a:effectLst/>
-        </p:spPr>
-        <p:style>
-          <a:lnRef idx="2">
-            <a:srgbClr val="4F81BD">
-              <a:shade val="50000"/>
-            </a:srgbClr>
-          </a:lnRef>
-          <a:fillRef idx="1">
-            <a:srgbClr val="4F81BD"/>
-          </a:fillRef>
-          <a:effectRef idx="0">
-            <a:srgbClr val="4F81BD"/>
-          </a:effectRef>
-          <a:fontRef idx="minor">
-            <a:srgbClr val="000000"/>
-          </a:fontRef>
-        </p:style>
-        <p:txBody>
-          <a:bodyPr wrap="none" lIns="45720" tIns="18288" rIns="45720" bIns="18288" rtlCol="0" anchor="ctr">
-            <a:noAutofit/>
-          </a:bodyPr>
-          <a:lstStyle/>
-          <a:p>
-            <a:r>
-              <a:rPr lang="en-US" sz="1200" dirty="0" err="1">
-                <a:latin typeface="Segoe UI" pitchFamily="34" charset="0"/>
-                <a:cs typeface="Segoe UI" pitchFamily="34" charset="0"/>
-              </a:rPr>
-              <a:t>Entrepôt</a:t>
-            </a:r>
-            <a:r>
-              <a:rPr lang="en-US" sz="1200" dirty="0">
-                <a:latin typeface="Segoe UI" pitchFamily="34" charset="0"/>
-                <a:cs typeface="Segoe UI" pitchFamily="34" charset="0"/>
-              </a:rPr>
-              <a:t> : </a:t>
-            </a:r>
-            <a:endParaRPr lang="en-US" sz="1200" dirty="0">
-              <a:solidFill>
-                <a:srgbClr val="000000"/>
-              </a:solidFill>
-              <a:latin typeface="Segoe UI" pitchFamily="34" charset="0"/>
-              <a:cs typeface="Segoe UI" pitchFamily="34" charset="0"/>
-            </a:endParaRPr>
-          </a:p>
-        </p:txBody>
-      </p:sp>
-      <p:sp>
-        <p:nvSpPr>
           <p:cNvPr id="28" name="MousePointer">
             <a:extLst>
               <a:ext uri="{FF2B5EF4-FFF2-40B4-BE49-F238E27FC236}">
@@ -5827,7 +5660,7 @@
           <p:cNvSpPr/>
           <p:nvPr>
             <p:custDataLst>
-              <p:custData r:id="rId11"/>
+              <p:custData r:id="rId10"/>
             </p:custDataLst>
           </p:nvPr>
         </p:nvSpPr>
@@ -10522,7 +10355,7 @@
 
 <file path=customXml/item1.xml><?xml version="1.0" encoding="utf-8"?>
 <Control xmlns="http://schemas.microsoft.com/VisualStudio/2011/storyboarding/control">
-  <Id Name="System.Storyboarding.Backgrounds.Window" Revision="1" Stencil="System.Storyboarding.Backgrounds" StencilVersion="0.1"/>
+  <Id Name="System.Storyboarding.Common.TextInput" Revision="1" Stencil="System.Storyboarding.Common" StencilVersion="0.1"/>
 </Control>
 </file>
 
@@ -10534,13 +10367,13 @@
 
 <file path=customXml/item11.xml><?xml version="1.0" encoding="utf-8"?>
 <Control xmlns="http://schemas.microsoft.com/VisualStudio/2011/storyboarding/control">
-  <Id Name="System.Storyboarding.Common.Button" Revision="1" Stencil="System.Storyboarding.Common" StencilVersion="0.1"/>
+  <Id Name="System.Storyboarding.Common.TextInput" Revision="1" Stencil="System.Storyboarding.Common" StencilVersion="0.1"/>
 </Control>
 </file>
 
 <file path=customXml/item12.xml><?xml version="1.0" encoding="utf-8"?>
 <Control xmlns="http://schemas.microsoft.com/VisualStudio/2011/storyboarding/control">
-  <Id Name="System.Storyboarding.Common.Button" Revision="1" Stencil="System.Storyboarding.Common" StencilVersion="0.1"/>
+  <Id Name="System.Storyboarding.Common.TextInput" Revision="1" Stencil="System.Storyboarding.Common" StencilVersion="0.1"/>
 </Control>
 </file>
 
@@ -10558,13 +10391,13 @@
 
 <file path=customXml/item15.xml><?xml version="1.0" encoding="utf-8"?>
 <Control xmlns="http://schemas.microsoft.com/VisualStudio/2011/storyboarding/control">
-  <Id Name="System.Storyboarding.Common.TextInput" Revision="1" Stencil="System.Storyboarding.Common" StencilVersion="0.1"/>
+  <Id Name="System.Storyboarding.Backgrounds.Window" Revision="1" Stencil="System.Storyboarding.Backgrounds" StencilVersion="0.1"/>
 </Control>
 </file>
 
 <file path=customXml/item16.xml><?xml version="1.0" encoding="utf-8"?>
 <Control xmlns="http://schemas.microsoft.com/VisualStudio/2011/storyboarding/control">
-  <Id Name="System.Storyboarding.Common.TextInput" Revision="1" Stencil="System.Storyboarding.Common" StencilVersion="0.1"/>
+  <Id Name="System.Storyboarding.Common.Button" Revision="1" Stencil="System.Storyboarding.Common" StencilVersion="0.1"/>
 </Control>
 </file>
 
@@ -10576,13 +10409,13 @@
 
 <file path=customXml/item18.xml><?xml version="1.0" encoding="utf-8"?>
 <Control xmlns="http://schemas.microsoft.com/VisualStudio/2011/storyboarding/control">
-  <Id Name="System.Storyboarding.Backgrounds.Window" Revision="1" Stencil="System.Storyboarding.Backgrounds" StencilVersion="0.1"/>
+  <Id Name="System.Storyboarding.Common.Button" Revision="1" Stencil="System.Storyboarding.Common" StencilVersion="0.1"/>
 </Control>
 </file>
 
 <file path=customXml/item19.xml><?xml version="1.0" encoding="utf-8"?>
 <Control xmlns="http://schemas.microsoft.com/VisualStudio/2011/storyboarding/control">
-  <Id Name="System.Storyboarding.Common.TextInput" Revision="1" Stencil="System.Storyboarding.Common" StencilVersion="0.1"/>
+  <Id Name="System.Storyboarding.Common.MousePointer" Revision="1" Stencil="System.Storyboarding.Common" StencilVersion="0.1"/>
 </Control>
 </file>
 
@@ -10606,13 +10439,13 @@
 
 <file path=customXml/item22.xml><?xml version="1.0" encoding="utf-8"?>
 <Control xmlns="http://schemas.microsoft.com/VisualStudio/2011/storyboarding/control">
-  <Id Name="System.Storyboarding.Common.Button" Revision="1" Stencil="System.Storyboarding.Common" StencilVersion="0.1"/>
+  <Id Name="System.Storyboarding.Common.TextInput" Revision="1" Stencil="System.Storyboarding.Common" StencilVersion="0.1"/>
 </Control>
 </file>
 
 <file path=customXml/item23.xml><?xml version="1.0" encoding="utf-8"?>
 <Control xmlns="http://schemas.microsoft.com/VisualStudio/2011/storyboarding/control">
-  <Id Name="System.Storyboarding.Common.TextInput" Revision="1" Stencil="System.Storyboarding.Common" StencilVersion="0.1"/>
+  <Id Name="System.Storyboarding.Common.Button" Revision="1" Stencil="System.Storyboarding.Common" StencilVersion="0.1"/>
 </Control>
 </file>
 
@@ -10630,7 +10463,7 @@
 
 <file path=customXml/item26.xml><?xml version="1.0" encoding="utf-8"?>
 <Control xmlns="http://schemas.microsoft.com/VisualStudio/2011/storyboarding/control">
-  <Id Name="System.Storyboarding.Common.DataGrid" Revision="1" Stencil="System.Storyboarding.Common" StencilVersion="0.1"/>
+  <Id Name="System.Storyboarding.Common.Button" Revision="1" Stencil="System.Storyboarding.Common" StencilVersion="0.1"/>
 </Control>
 </file>
 
@@ -10666,25 +10499,25 @@
 
 <file path=customXml/item31.xml><?xml version="1.0" encoding="utf-8"?>
 <Control xmlns="http://schemas.microsoft.com/VisualStudio/2011/storyboarding/control">
-  <Id Name="System.Storyboarding.Common.Button" Revision="1" Stencil="System.Storyboarding.Common" StencilVersion="0.1"/>
+  <Id Name="System.Storyboarding.Backgrounds.Window" Revision="1" Stencil="System.Storyboarding.Backgrounds" StencilVersion="0.1"/>
 </Control>
 </file>
 
 <file path=customXml/item32.xml><?xml version="1.0" encoding="utf-8"?>
 <Control xmlns="http://schemas.microsoft.com/VisualStudio/2011/storyboarding/control">
-  <Id Name="System.Storyboarding.Common.Button" Revision="1" Stencil="System.Storyboarding.Common" StencilVersion="0.1"/>
+  <Id Name="System.Storyboarding.Backgrounds.Window" Revision="1" Stencil="System.Storyboarding.Backgrounds" StencilVersion="0.1"/>
 </Control>
 </file>
 
 <file path=customXml/item33.xml><?xml version="1.0" encoding="utf-8"?>
 <Control xmlns="http://schemas.microsoft.com/VisualStudio/2011/storyboarding/control">
-  <Id Name="System.Storyboarding.Common.Button" Revision="1" Stencil="System.Storyboarding.Common" StencilVersion="0.1"/>
+  <Id Name="System.Storyboarding.Common.TextInput" Revision="1" Stencil="System.Storyboarding.Common" StencilVersion="0.1"/>
 </Control>
 </file>
 
 <file path=customXml/item34.xml><?xml version="1.0" encoding="utf-8"?>
 <Control xmlns="http://schemas.microsoft.com/VisualStudio/2011/storyboarding/control">
-  <Id Name="System.Storyboarding.Common.Button" Revision="1" Stencil="System.Storyboarding.Common" StencilVersion="0.1"/>
+  <Id Name="System.Storyboarding.Common.TextInput" Revision="1" Stencil="System.Storyboarding.Common" StencilVersion="0.1"/>
 </Control>
 </file>
 
@@ -10702,25 +10535,25 @@
 
 <file path=customXml/item37.xml><?xml version="1.0" encoding="utf-8"?>
 <Control xmlns="http://schemas.microsoft.com/VisualStudio/2011/storyboarding/control">
-  <Id Name="System.Storyboarding.Common.MousePointer" Revision="1" Stencil="System.Storyboarding.Common" StencilVersion="0.1"/>
+  <Id Name="System.Storyboarding.Common.Button" Revision="1" Stencil="System.Storyboarding.Common" StencilVersion="0.1"/>
 </Control>
 </file>
 
 <file path=customXml/item38.xml><?xml version="1.0" encoding="utf-8"?>
 <Control xmlns="http://schemas.microsoft.com/VisualStudio/2011/storyboarding/control">
-  <Id Name="System.Storyboarding.Backgrounds.Window" Revision="1" Stencil="System.Storyboarding.Backgrounds" StencilVersion="0.1"/>
+  <Id Name="System.Storyboarding.Common.Button" Revision="1" Stencil="System.Storyboarding.Common" StencilVersion="0.1"/>
 </Control>
 </file>
 
 <file path=customXml/item39.xml><?xml version="1.0" encoding="utf-8"?>
 <Control xmlns="http://schemas.microsoft.com/VisualStudio/2011/storyboarding/control">
-  <Id Name="System.Storyboarding.Common.TextInput" Revision="1" Stencil="System.Storyboarding.Common" StencilVersion="0.1"/>
+  <Id Name="System.Storyboarding.Common.Button" Revision="1" Stencil="System.Storyboarding.Common" StencilVersion="0.1"/>
 </Control>
 </file>
 
 <file path=customXml/item4.xml><?xml version="1.0" encoding="utf-8"?>
 <Control xmlns="http://schemas.microsoft.com/VisualStudio/2011/storyboarding/control">
-  <Id Name="System.Storyboarding.Common.TextInput" Revision="1" Stencil="System.Storyboarding.Common" StencilVersion="0.1"/>
+  <Id Name="System.Storyboarding.Common.Button" Revision="1" Stencil="System.Storyboarding.Common" StencilVersion="0.1"/>
 </Control>
 </file>
 
@@ -10732,7 +10565,7 @@
 
 <file path=customXml/item41.xml><?xml version="1.0" encoding="utf-8"?>
 <Control xmlns="http://schemas.microsoft.com/VisualStudio/2011/storyboarding/control">
-  <Id Name="System.Storyboarding.Common.Button" Revision="1" Stencil="System.Storyboarding.Common" StencilVersion="0.1"/>
+  <Id Name="System.Storyboarding.Common.TextInput" Revision="1" Stencil="System.Storyboarding.Common" StencilVersion="0.1"/>
 </Control>
 </file>
 
@@ -10750,13 +10583,13 @@
 
 <file path=customXml/item44.xml><?xml version="1.0" encoding="utf-8"?>
 <Control xmlns="http://schemas.microsoft.com/VisualStudio/2011/storyboarding/control">
-  <Id Name="System.Storyboarding.Common.Button" Revision="1" Stencil="System.Storyboarding.Common" StencilVersion="0.1"/>
+  <Id Name="System.Storyboarding.Backgrounds.Window" Revision="1" Stencil="System.Storyboarding.Backgrounds" StencilVersion="0.1"/>
 </Control>
 </file>
 
 <file path=customXml/item45.xml><?xml version="1.0" encoding="utf-8"?>
 <Control xmlns="http://schemas.microsoft.com/VisualStudio/2011/storyboarding/control">
-  <Id Name="System.Storyboarding.Common.Button" Revision="1" Stencil="System.Storyboarding.Common" StencilVersion="0.1"/>
+  <Id Name="System.Storyboarding.Common.DataGrid" Revision="1" Stencil="System.Storyboarding.Common" StencilVersion="0.1"/>
 </Control>
 </file>
 
@@ -10768,13 +10601,13 @@
 
 <file path=customXml/item47.xml><?xml version="1.0" encoding="utf-8"?>
 <Control xmlns="http://schemas.microsoft.com/VisualStudio/2011/storyboarding/control">
-  <Id Name="System.Storyboarding.Common.TextInput" Revision="1" Stencil="System.Storyboarding.Common" StencilVersion="0.1"/>
+  <Id Name="System.Storyboarding.Common.Button" Revision="1" Stencil="System.Storyboarding.Common" StencilVersion="0.1"/>
 </Control>
 </file>
 
 <file path=customXml/item48.xml><?xml version="1.0" encoding="utf-8"?>
 <Control xmlns="http://schemas.microsoft.com/VisualStudio/2011/storyboarding/control">
-  <Id Name="System.Storyboarding.Common.MousePointer" Revision="1" Stencil="System.Storyboarding.Common" StencilVersion="0.1"/>
+  <Id Name="System.Storyboarding.Common.Button" Revision="1" Stencil="System.Storyboarding.Common" StencilVersion="0.1"/>
 </Control>
 </file>
 
@@ -10786,13 +10619,13 @@
 
 <file path=customXml/item5.xml><?xml version="1.0" encoding="utf-8"?>
 <Control xmlns="http://schemas.microsoft.com/VisualStudio/2011/storyboarding/control">
-  <Id Name="System.Storyboarding.Common.TextInput" Revision="1" Stencil="System.Storyboarding.Common" StencilVersion="0.1"/>
+  <Id Name="System.Storyboarding.Common.Button" Revision="1" Stencil="System.Storyboarding.Common" StencilVersion="0.1"/>
 </Control>
 </file>
 
 <file path=customXml/item50.xml><?xml version="1.0" encoding="utf-8"?>
 <Control xmlns="http://schemas.microsoft.com/VisualStudio/2011/storyboarding/control">
-  <Id Name="System.Storyboarding.Common.Button" Revision="1" Stencil="System.Storyboarding.Common" StencilVersion="0.1"/>
+  <Id Name="System.Storyboarding.Common.TextInput" Revision="1" Stencil="System.Storyboarding.Common" StencilVersion="0.1"/>
 </Control>
 </file>
 
@@ -10804,19 +10637,19 @@
 
 <file path=customXml/item6.xml><?xml version="1.0" encoding="utf-8"?>
 <Control xmlns="http://schemas.microsoft.com/VisualStudio/2011/storyboarding/control">
-  <Id Name="System.Storyboarding.Backgrounds.Window" Revision="1" Stencil="System.Storyboarding.Backgrounds" StencilVersion="0.1"/>
+  <Id Name="System.Storyboarding.Common.TextInput" Revision="1" Stencil="System.Storyboarding.Common" StencilVersion="0.1"/>
 </Control>
 </file>
 
 <file path=customXml/item7.xml><?xml version="1.0" encoding="utf-8"?>
 <Control xmlns="http://schemas.microsoft.com/VisualStudio/2011/storyboarding/control">
-  <Id Name="System.Storyboarding.Common.TextInput" Revision="1" Stencil="System.Storyboarding.Common" StencilVersion="0.1"/>
+  <Id Name="System.Storyboarding.Common.Button" Revision="1" Stencil="System.Storyboarding.Common" StencilVersion="0.1"/>
 </Control>
 </file>
 
 <file path=customXml/item8.xml><?xml version="1.0" encoding="utf-8"?>
 <Control xmlns="http://schemas.microsoft.com/VisualStudio/2011/storyboarding/control">
-  <Id Name="System.Storyboarding.Common.Button" Revision="1" Stencil="System.Storyboarding.Common" StencilVersion="0.1"/>
+  <Id Name="System.Storyboarding.Common.MousePointer" Revision="1" Stencil="System.Storyboarding.Common" StencilVersion="0.1"/>
 </Control>
 </file>
 
@@ -10827,7 +10660,7 @@
 </file>
 
 <file path=customXml/itemProps1.xml><?xml version="1.0" encoding="utf-8"?>
-<ds:datastoreItem xmlns:ds="http://schemas.openxmlformats.org/officeDocument/2006/customXml" ds:itemID="{6B5BC257-2CC4-453E-B3D2-F8D6926FCB3F}">
+<ds:datastoreItem xmlns:ds="http://schemas.openxmlformats.org/officeDocument/2006/customXml" ds:itemID="{8BEC3990-606D-4AD5-82D6-A5F07D9862F6}">
   <ds:schemaRefs>
     <ds:schemaRef ds:uri="http://schemas.microsoft.com/VisualStudio/2011/storyboarding/control"/>
   </ds:schemaRefs>
@@ -10835,7 +10668,7 @@
 </file>
 
 <file path=customXml/itemProps10.xml><?xml version="1.0" encoding="utf-8"?>
-<ds:datastoreItem xmlns:ds="http://schemas.openxmlformats.org/officeDocument/2006/customXml" ds:itemID="{CEE6976E-0CB3-4797-A4F7-3BAF04AB0BB9}">
+<ds:datastoreItem xmlns:ds="http://schemas.openxmlformats.org/officeDocument/2006/customXml" ds:itemID="{B860EFEF-77B0-4CEC-84DD-277110DFC015}">
   <ds:schemaRefs>
     <ds:schemaRef ds:uri="http://schemas.microsoft.com/VisualStudio/2011/storyboarding/control"/>
   </ds:schemaRefs>
@@ -10843,7 +10676,7 @@
 </file>
 
 <file path=customXml/itemProps11.xml><?xml version="1.0" encoding="utf-8"?>
-<ds:datastoreItem xmlns:ds="http://schemas.openxmlformats.org/officeDocument/2006/customXml" ds:itemID="{1992035E-320D-4EFA-A5B6-7C12EB72A848}">
+<ds:datastoreItem xmlns:ds="http://schemas.openxmlformats.org/officeDocument/2006/customXml" ds:itemID="{3362FC04-F650-4327-88A4-5A242A794C57}">
   <ds:schemaRefs>
     <ds:schemaRef ds:uri="http://schemas.microsoft.com/VisualStudio/2011/storyboarding/control"/>
   </ds:schemaRefs>
@@ -10851,7 +10684,7 @@
 </file>
 
 <file path=customXml/itemProps12.xml><?xml version="1.0" encoding="utf-8"?>
-<ds:datastoreItem xmlns:ds="http://schemas.openxmlformats.org/officeDocument/2006/customXml" ds:itemID="{62DDCA30-DB9C-4A25-A130-EF29A9087AF3}">
+<ds:datastoreItem xmlns:ds="http://schemas.openxmlformats.org/officeDocument/2006/customXml" ds:itemID="{443604CC-5EAA-403C-931E-EF69503BF646}">
   <ds:schemaRefs>
     <ds:schemaRef ds:uri="http://schemas.microsoft.com/VisualStudio/2011/storyboarding/control"/>
   </ds:schemaRefs>
@@ -10859,14 +10692,6 @@
 </file>
 
 <file path=customXml/itemProps13.xml><?xml version="1.0" encoding="utf-8"?>
-<ds:datastoreItem xmlns:ds="http://schemas.openxmlformats.org/officeDocument/2006/customXml" ds:itemID="{E6685E5C-3ECE-4BCC-B78F-120033519A3F}">
-  <ds:schemaRefs>
-    <ds:schemaRef ds:uri="http://schemas.microsoft.com/VisualStudio/2011/storyboarding/control"/>
-  </ds:schemaRefs>
-</ds:datastoreItem>
-</file>
-
-<file path=customXml/itemProps14.xml><?xml version="1.0" encoding="utf-8"?>
 <ds:datastoreItem xmlns:ds="http://schemas.openxmlformats.org/officeDocument/2006/customXml" ds:itemID="{51861FE7-5575-4324-870B-B17F09F4FE54}">
   <ds:schemaRefs>
     <ds:schemaRef ds:uri="http://schemas.microsoft.com/VisualStudio/2011/storyboarding/control"/>
@@ -10874,40 +10699,48 @@
 </ds:datastoreItem>
 </file>
 
-<file path=customXml/itemProps15.xml><?xml version="1.0" encoding="utf-8"?>
-<ds:datastoreItem xmlns:ds="http://schemas.openxmlformats.org/officeDocument/2006/customXml" ds:itemID="{6E50A3B9-AF74-4E5F-BAFE-184363B7F7FE}">
+<file path=customXml/itemProps14.xml><?xml version="1.0" encoding="utf-8"?>
+<ds:datastoreItem xmlns:ds="http://schemas.openxmlformats.org/officeDocument/2006/customXml" ds:itemID="{B5A81EFB-7254-4167-8927-95D4C950A469}">
   <ds:schemaRefs>
     <ds:schemaRef ds:uri="http://schemas.microsoft.com/VisualStudio/2011/storyboarding/control"/>
   </ds:schemaRefs>
 </ds:datastoreItem>
 </file>
 
-<file path=customXml/itemProps16.xml><?xml version="1.0" encoding="utf-8"?>
-<ds:datastoreItem xmlns:ds="http://schemas.openxmlformats.org/officeDocument/2006/customXml" ds:itemID="{97652D7E-517D-4876-80FD-FA40038BAD67}">
+<file path=customXml/itemProps15.xml><?xml version="1.0" encoding="utf-8"?>
+<ds:datastoreItem xmlns:ds="http://schemas.openxmlformats.org/officeDocument/2006/customXml" ds:itemID="{5AB5A3F1-E3CF-40FE-BA5F-C5BEA8396020}">
   <ds:schemaRefs>
     <ds:schemaRef ds:uri="http://schemas.microsoft.com/VisualStudio/2011/storyboarding/control"/>
   </ds:schemaRefs>
 </ds:datastoreItem>
 </file>
 
-<file path=customXml/itemProps17.xml><?xml version="1.0" encoding="utf-8"?>
-<ds:datastoreItem xmlns:ds="http://schemas.openxmlformats.org/officeDocument/2006/customXml" ds:itemID="{D1E23F66-8825-4FC1-B181-90D63F0BBB54}">
+<file path=customXml/itemProps16.xml><?xml version="1.0" encoding="utf-8"?>
+<ds:datastoreItem xmlns:ds="http://schemas.openxmlformats.org/officeDocument/2006/customXml" ds:itemID="{5722C555-2686-4A69-A227-38015FDD6B1B}">
   <ds:schemaRefs>
     <ds:schemaRef ds:uri="http://schemas.microsoft.com/VisualStudio/2011/storyboarding/control"/>
   </ds:schemaRefs>
 </ds:datastoreItem>
 </file>
 
-<file path=customXml/itemProps18.xml><?xml version="1.0" encoding="utf-8"?>
-<ds:datastoreItem xmlns:ds="http://schemas.openxmlformats.org/officeDocument/2006/customXml" ds:itemID="{1F07089E-7247-42D0-9789-A8864994D0EB}">
+<file path=customXml/itemProps17.xml><?xml version="1.0" encoding="utf-8"?>
+<ds:datastoreItem xmlns:ds="http://schemas.openxmlformats.org/officeDocument/2006/customXml" ds:itemID="{0424BB6B-A62A-44D0-A363-8AA6CF8B199E}">
   <ds:schemaRefs>
     <ds:schemaRef ds:uri="http://schemas.microsoft.com/VisualStudio/2011/storyboarding/control"/>
   </ds:schemaRefs>
 </ds:datastoreItem>
 </file>
 
+<file path=customXml/itemProps18.xml><?xml version="1.0" encoding="utf-8"?>
+<ds:datastoreItem xmlns:ds="http://schemas.openxmlformats.org/officeDocument/2006/customXml" ds:itemID="{C0C94C70-95FF-421C-A0BF-D896AEF3409B}">
+  <ds:schemaRefs>
+    <ds:schemaRef ds:uri="http://schemas.microsoft.com/VisualStudio/2011/storyboarding/control"/>
+  </ds:schemaRefs>
+</ds:datastoreItem>
+</file>
+
 <file path=customXml/itemProps19.xml><?xml version="1.0" encoding="utf-8"?>
-<ds:datastoreItem xmlns:ds="http://schemas.openxmlformats.org/officeDocument/2006/customXml" ds:itemID="{443604CC-5EAA-403C-931E-EF69503BF646}">
+<ds:datastoreItem xmlns:ds="http://schemas.openxmlformats.org/officeDocument/2006/customXml" ds:itemID="{E5C74C48-2726-4B8F-97F5-6A985C7CC158}">
   <ds:schemaRefs>
     <ds:schemaRef ds:uri="http://schemas.microsoft.com/VisualStudio/2011/storyboarding/control"/>
   </ds:schemaRefs>
@@ -10923,7 +10756,7 @@
 </file>
 
 <file path=customXml/itemProps20.xml><?xml version="1.0" encoding="utf-8"?>
-<ds:datastoreItem xmlns:ds="http://schemas.openxmlformats.org/officeDocument/2006/customXml" ds:itemID="{BCF52D08-9FE2-49F5-AC44-8998E497D605}">
+<ds:datastoreItem xmlns:ds="http://schemas.openxmlformats.org/officeDocument/2006/customXml" ds:itemID="{3CD7C25F-0342-474E-BD7B-AF969A9D2426}">
   <ds:schemaRefs>
     <ds:schemaRef ds:uri="http://schemas.microsoft.com/VisualStudio/2011/storyboarding/control"/>
   </ds:schemaRefs>
@@ -10931,7 +10764,7 @@
 </file>
 
 <file path=customXml/itemProps21.xml><?xml version="1.0" encoding="utf-8"?>
-<ds:datastoreItem xmlns:ds="http://schemas.openxmlformats.org/officeDocument/2006/customXml" ds:itemID="{D650F72D-7E92-4B76-972A-D5B9E6D72500}">
+<ds:datastoreItem xmlns:ds="http://schemas.openxmlformats.org/officeDocument/2006/customXml" ds:itemID="{32EDC4AF-D292-4D7A-AA4E-95662EA2D514}">
   <ds:schemaRefs>
     <ds:schemaRef ds:uri="http://schemas.microsoft.com/VisualStudio/2011/storyboarding/control"/>
   </ds:schemaRefs>
@@ -10939,7 +10772,7 @@
 </file>
 
 <file path=customXml/itemProps22.xml><?xml version="1.0" encoding="utf-8"?>
-<ds:datastoreItem xmlns:ds="http://schemas.openxmlformats.org/officeDocument/2006/customXml" ds:itemID="{B5A81EFB-7254-4167-8927-95D4C950A469}">
+<ds:datastoreItem xmlns:ds="http://schemas.openxmlformats.org/officeDocument/2006/customXml" ds:itemID="{784F6A46-CFD1-4C28-AA16-A415958B3992}">
   <ds:schemaRefs>
     <ds:schemaRef ds:uri="http://schemas.microsoft.com/VisualStudio/2011/storyboarding/control"/>
   </ds:schemaRefs>
@@ -10947,7 +10780,7 @@
 </file>
 
 <file path=customXml/itemProps23.xml><?xml version="1.0" encoding="utf-8"?>
-<ds:datastoreItem xmlns:ds="http://schemas.openxmlformats.org/officeDocument/2006/customXml" ds:itemID="{1D996B62-7CC9-41E0-8A81-4F439B295894}">
+<ds:datastoreItem xmlns:ds="http://schemas.openxmlformats.org/officeDocument/2006/customXml" ds:itemID="{62DDCA30-DB9C-4A25-A130-EF29A9087AF3}">
   <ds:schemaRefs>
     <ds:schemaRef ds:uri="http://schemas.microsoft.com/VisualStudio/2011/storyboarding/control"/>
   </ds:schemaRefs>
@@ -10955,7 +10788,7 @@
 </file>
 
 <file path=customXml/itemProps24.xml><?xml version="1.0" encoding="utf-8"?>
-<ds:datastoreItem xmlns:ds="http://schemas.openxmlformats.org/officeDocument/2006/customXml" ds:itemID="{707F4863-0B48-4841-A482-D1E152083FF6}">
+<ds:datastoreItem xmlns:ds="http://schemas.openxmlformats.org/officeDocument/2006/customXml" ds:itemID="{D1E23F66-8825-4FC1-B181-90D63F0BBB54}">
   <ds:schemaRefs>
     <ds:schemaRef ds:uri="http://schemas.microsoft.com/VisualStudio/2011/storyboarding/control"/>
   </ds:schemaRefs>
@@ -10971,70 +10804,6 @@
 </file>
 
 <file path=customXml/itemProps26.xml><?xml version="1.0" encoding="utf-8"?>
-<ds:datastoreItem xmlns:ds="http://schemas.openxmlformats.org/officeDocument/2006/customXml" ds:itemID="{94174B8B-BA9E-488E-8243-1C7154278A05}">
-  <ds:schemaRefs>
-    <ds:schemaRef ds:uri="http://schemas.microsoft.com/VisualStudio/2011/storyboarding/control"/>
-  </ds:schemaRefs>
-</ds:datastoreItem>
-</file>
-
-<file path=customXml/itemProps27.xml><?xml version="1.0" encoding="utf-8"?>
-<ds:datastoreItem xmlns:ds="http://schemas.openxmlformats.org/officeDocument/2006/customXml" ds:itemID="{5AB5A3F1-E3CF-40FE-BA5F-C5BEA8396020}">
-  <ds:schemaRefs>
-    <ds:schemaRef ds:uri="http://schemas.microsoft.com/VisualStudio/2011/storyboarding/control"/>
-  </ds:schemaRefs>
-</ds:datastoreItem>
-</file>
-
-<file path=customXml/itemProps28.xml><?xml version="1.0" encoding="utf-8"?>
-<ds:datastoreItem xmlns:ds="http://schemas.openxmlformats.org/officeDocument/2006/customXml" ds:itemID="{FCF115D8-4A89-457D-A249-7B119C853405}">
-  <ds:schemaRefs>
-    <ds:schemaRef ds:uri="http://schemas.microsoft.com/VisualStudio/2011/storyboarding/control"/>
-  </ds:schemaRefs>
-</ds:datastoreItem>
-</file>
-
-<file path=customXml/itemProps29.xml><?xml version="1.0" encoding="utf-8"?>
-<ds:datastoreItem xmlns:ds="http://schemas.openxmlformats.org/officeDocument/2006/customXml" ds:itemID="{196580ED-962A-4CB7-B55E-672B87E455C5}">
-  <ds:schemaRefs>
-    <ds:schemaRef ds:uri="http://schemas.microsoft.com/VisualStudio/2011/storyboarding/control"/>
-  </ds:schemaRefs>
-</ds:datastoreItem>
-</file>
-
-<file path=customXml/itemProps3.xml><?xml version="1.0" encoding="utf-8"?>
-<ds:datastoreItem xmlns:ds="http://schemas.openxmlformats.org/officeDocument/2006/customXml" ds:itemID="{784F6A46-CFD1-4C28-AA16-A415958B3992}">
-  <ds:schemaRefs>
-    <ds:schemaRef ds:uri="http://schemas.microsoft.com/VisualStudio/2011/storyboarding/control"/>
-  </ds:schemaRefs>
-</ds:datastoreItem>
-</file>
-
-<file path=customXml/itemProps30.xml><?xml version="1.0" encoding="utf-8"?>
-<ds:datastoreItem xmlns:ds="http://schemas.openxmlformats.org/officeDocument/2006/customXml" ds:itemID="{5722C555-2686-4A69-A227-38015FDD6B1B}">
-  <ds:schemaRefs>
-    <ds:schemaRef ds:uri="http://schemas.microsoft.com/VisualStudio/2011/storyboarding/control"/>
-  </ds:schemaRefs>
-</ds:datastoreItem>
-</file>
-
-<file path=customXml/itemProps31.xml><?xml version="1.0" encoding="utf-8"?>
-<ds:datastoreItem xmlns:ds="http://schemas.openxmlformats.org/officeDocument/2006/customXml" ds:itemID="{B800AE0D-CA0A-4444-9A70-B25C37ABECAD}">
-  <ds:schemaRefs>
-    <ds:schemaRef ds:uri="http://schemas.microsoft.com/VisualStudio/2011/storyboarding/control"/>
-  </ds:schemaRefs>
-</ds:datastoreItem>
-</file>
-
-<file path=customXml/itemProps32.xml><?xml version="1.0" encoding="utf-8"?>
-<ds:datastoreItem xmlns:ds="http://schemas.openxmlformats.org/officeDocument/2006/customXml" ds:itemID="{E6CD4BFC-EF2C-48B1-85E7-60DC682AD850}">
-  <ds:schemaRefs>
-    <ds:schemaRef ds:uri="http://schemas.microsoft.com/VisualStudio/2011/storyboarding/control"/>
-  </ds:schemaRefs>
-</ds:datastoreItem>
-</file>
-
-<file path=customXml/itemProps33.xml><?xml version="1.0" encoding="utf-8"?>
 <ds:datastoreItem xmlns:ds="http://schemas.openxmlformats.org/officeDocument/2006/customXml" ds:itemID="{F5841C0A-3D81-4C41-945A-75C6C115CC67}">
   <ds:schemaRefs>
     <ds:schemaRef ds:uri="http://schemas.microsoft.com/VisualStudio/2011/storyboarding/control"/>
@@ -11042,16 +10811,80 @@
 </ds:datastoreItem>
 </file>
 
-<file path=customXml/itemProps34.xml><?xml version="1.0" encoding="utf-8"?>
-<ds:datastoreItem xmlns:ds="http://schemas.openxmlformats.org/officeDocument/2006/customXml" ds:itemID="{91524E44-9B9E-49F4-9076-A97D3BB9990B}">
+<file path=customXml/itemProps27.xml><?xml version="1.0" encoding="utf-8"?>
+<ds:datastoreItem xmlns:ds="http://schemas.openxmlformats.org/officeDocument/2006/customXml" ds:itemID="{7487577C-FC1C-4261-A1A1-A767E630D48A}">
   <ds:schemaRefs>
     <ds:schemaRef ds:uri="http://schemas.microsoft.com/VisualStudio/2011/storyboarding/control"/>
   </ds:schemaRefs>
 </ds:datastoreItem>
 </file>
 
+<file path=customXml/itemProps28.xml><?xml version="1.0" encoding="utf-8"?>
+<ds:datastoreItem xmlns:ds="http://schemas.openxmlformats.org/officeDocument/2006/customXml" ds:itemID="{87171C52-2F23-46C5-A5C8-63197BF78C7C}">
+  <ds:schemaRefs>
+    <ds:schemaRef ds:uri="http://schemas.microsoft.com/VisualStudio/2011/storyboarding/control"/>
+  </ds:schemaRefs>
+</ds:datastoreItem>
+</file>
+
+<file path=customXml/itemProps29.xml><?xml version="1.0" encoding="utf-8"?>
+<ds:datastoreItem xmlns:ds="http://schemas.openxmlformats.org/officeDocument/2006/customXml" ds:itemID="{BCF52D08-9FE2-49F5-AC44-8998E497D605}">
+  <ds:schemaRefs>
+    <ds:schemaRef ds:uri="http://schemas.microsoft.com/VisualStudio/2011/storyboarding/control"/>
+  </ds:schemaRefs>
+</ds:datastoreItem>
+</file>
+
+<file path=customXml/itemProps3.xml><?xml version="1.0" encoding="utf-8"?>
+<ds:datastoreItem xmlns:ds="http://schemas.openxmlformats.org/officeDocument/2006/customXml" ds:itemID="{97652D7E-517D-4876-80FD-FA40038BAD67}">
+  <ds:schemaRefs>
+    <ds:schemaRef ds:uri="http://schemas.microsoft.com/VisualStudio/2011/storyboarding/control"/>
+  </ds:schemaRefs>
+</ds:datastoreItem>
+</file>
+
+<file path=customXml/itemProps30.xml><?xml version="1.0" encoding="utf-8"?>
+<ds:datastoreItem xmlns:ds="http://schemas.openxmlformats.org/officeDocument/2006/customXml" ds:itemID="{F26CEECA-C66D-4F7C-A3A4-CBB09D7E6242}">
+  <ds:schemaRefs>
+    <ds:schemaRef ds:uri="http://schemas.microsoft.com/VisualStudio/2011/storyboarding/control"/>
+  </ds:schemaRefs>
+</ds:datastoreItem>
+</file>
+
+<file path=customXml/itemProps31.xml><?xml version="1.0" encoding="utf-8"?>
+<ds:datastoreItem xmlns:ds="http://schemas.openxmlformats.org/officeDocument/2006/customXml" ds:itemID="{6B5BC257-2CC4-453E-B3D2-F8D6926FCB3F}">
+  <ds:schemaRefs>
+    <ds:schemaRef ds:uri="http://schemas.microsoft.com/VisualStudio/2011/storyboarding/control"/>
+  </ds:schemaRefs>
+</ds:datastoreItem>
+</file>
+
+<file path=customXml/itemProps32.xml><?xml version="1.0" encoding="utf-8"?>
+<ds:datastoreItem xmlns:ds="http://schemas.openxmlformats.org/officeDocument/2006/customXml" ds:itemID="{8FA24B14-FAA1-46A9-B96F-394D92AAEBC1}">
+  <ds:schemaRefs>
+    <ds:schemaRef ds:uri="http://schemas.microsoft.com/VisualStudio/2011/storyboarding/control"/>
+  </ds:schemaRefs>
+</ds:datastoreItem>
+</file>
+
+<file path=customXml/itemProps33.xml><?xml version="1.0" encoding="utf-8"?>
+<ds:datastoreItem xmlns:ds="http://schemas.openxmlformats.org/officeDocument/2006/customXml" ds:itemID="{6E50A3B9-AF74-4E5F-BAFE-184363B7F7FE}">
+  <ds:schemaRefs>
+    <ds:schemaRef ds:uri="http://schemas.microsoft.com/VisualStudio/2011/storyboarding/control"/>
+  </ds:schemaRefs>
+</ds:datastoreItem>
+</file>
+
+<file path=customXml/itemProps34.xml><?xml version="1.0" encoding="utf-8"?>
+<ds:datastoreItem xmlns:ds="http://schemas.openxmlformats.org/officeDocument/2006/customXml" ds:itemID="{1D996B62-7CC9-41E0-8A81-4F439B295894}">
+  <ds:schemaRefs>
+    <ds:schemaRef ds:uri="http://schemas.microsoft.com/VisualStudio/2011/storyboarding/control"/>
+  </ds:schemaRefs>
+</ds:datastoreItem>
+</file>
+
 <file path=customXml/itemProps35.xml><?xml version="1.0" encoding="utf-8"?>
-<ds:datastoreItem xmlns:ds="http://schemas.openxmlformats.org/officeDocument/2006/customXml" ds:itemID="{0424BB6B-A62A-44D0-A363-8AA6CF8B199E}">
+<ds:datastoreItem xmlns:ds="http://schemas.openxmlformats.org/officeDocument/2006/customXml" ds:itemID="{FCF115D8-4A89-457D-A249-7B119C853405}">
   <ds:schemaRefs>
     <ds:schemaRef ds:uri="http://schemas.microsoft.com/VisualStudio/2011/storyboarding/control"/>
   </ds:schemaRefs>
@@ -11067,6 +10900,158 @@
 </file>
 
 <file path=customXml/itemProps37.xml><?xml version="1.0" encoding="utf-8"?>
+<ds:datastoreItem xmlns:ds="http://schemas.openxmlformats.org/officeDocument/2006/customXml" ds:itemID="{8CC7D558-B2A2-4A4F-82E6-1087895837CA}">
+  <ds:schemaRefs>
+    <ds:schemaRef ds:uri="http://schemas.microsoft.com/VisualStudio/2011/storyboarding/control"/>
+  </ds:schemaRefs>
+</ds:datastoreItem>
+</file>
+
+<file path=customXml/itemProps38.xml><?xml version="1.0" encoding="utf-8"?>
+<ds:datastoreItem xmlns:ds="http://schemas.openxmlformats.org/officeDocument/2006/customXml" ds:itemID="{CEE6976E-0CB3-4797-A4F7-3BAF04AB0BB9}">
+  <ds:schemaRefs>
+    <ds:schemaRef ds:uri="http://schemas.microsoft.com/VisualStudio/2011/storyboarding/control"/>
+  </ds:schemaRefs>
+</ds:datastoreItem>
+</file>
+
+<file path=customXml/itemProps39.xml><?xml version="1.0" encoding="utf-8"?>
+<ds:datastoreItem xmlns:ds="http://schemas.openxmlformats.org/officeDocument/2006/customXml" ds:itemID="{B800AE0D-CA0A-4444-9A70-B25C37ABECAD}">
+  <ds:schemaRefs>
+    <ds:schemaRef ds:uri="http://schemas.microsoft.com/VisualStudio/2011/storyboarding/control"/>
+  </ds:schemaRefs>
+</ds:datastoreItem>
+</file>
+
+<file path=customXml/itemProps4.xml><?xml version="1.0" encoding="utf-8"?>
+<ds:datastoreItem xmlns:ds="http://schemas.openxmlformats.org/officeDocument/2006/customXml" ds:itemID="{196580ED-962A-4CB7-B55E-672B87E455C5}">
+  <ds:schemaRefs>
+    <ds:schemaRef ds:uri="http://schemas.microsoft.com/VisualStudio/2011/storyboarding/control"/>
+  </ds:schemaRefs>
+</ds:datastoreItem>
+</file>
+
+<file path=customXml/itemProps40.xml><?xml version="1.0" encoding="utf-8"?>
+<ds:datastoreItem xmlns:ds="http://schemas.openxmlformats.org/officeDocument/2006/customXml" ds:itemID="{8AF5FD22-16A8-4298-B4F9-BAB0DE1AB4AE}">
+  <ds:schemaRefs>
+    <ds:schemaRef ds:uri="http://schemas.microsoft.com/VisualStudio/2011/storyboarding/control"/>
+  </ds:schemaRefs>
+</ds:datastoreItem>
+</file>
+
+<file path=customXml/itemProps41.xml><?xml version="1.0" encoding="utf-8"?>
+<ds:datastoreItem xmlns:ds="http://schemas.openxmlformats.org/officeDocument/2006/customXml" ds:itemID="{A81F534F-D0F6-45BD-B392-5EEEDC85C53C}">
+  <ds:schemaRefs>
+    <ds:schemaRef ds:uri="http://schemas.microsoft.com/VisualStudio/2011/storyboarding/control"/>
+  </ds:schemaRefs>
+</ds:datastoreItem>
+</file>
+
+<file path=customXml/itemProps42.xml><?xml version="1.0" encoding="utf-8"?>
+<ds:datastoreItem xmlns:ds="http://schemas.openxmlformats.org/officeDocument/2006/customXml" ds:itemID="{8B1E44D7-B5E4-49CD-B7C9-64F9C07ED9AB}">
+  <ds:schemaRefs>
+    <ds:schemaRef ds:uri="http://schemas.microsoft.com/VisualStudio/2011/storyboarding/control"/>
+  </ds:schemaRefs>
+</ds:datastoreItem>
+</file>
+
+<file path=customXml/itemProps43.xml><?xml version="1.0" encoding="utf-8"?>
+<ds:datastoreItem xmlns:ds="http://schemas.openxmlformats.org/officeDocument/2006/customXml" ds:itemID="{E6685E5C-3ECE-4BCC-B78F-120033519A3F}">
+  <ds:schemaRefs>
+    <ds:schemaRef ds:uri="http://schemas.microsoft.com/VisualStudio/2011/storyboarding/control"/>
+  </ds:schemaRefs>
+</ds:datastoreItem>
+</file>
+
+<file path=customXml/itemProps44.xml><?xml version="1.0" encoding="utf-8"?>
+<ds:datastoreItem xmlns:ds="http://schemas.openxmlformats.org/officeDocument/2006/customXml" ds:itemID="{1F07089E-7247-42D0-9789-A8864994D0EB}">
+  <ds:schemaRefs>
+    <ds:schemaRef ds:uri="http://schemas.microsoft.com/VisualStudio/2011/storyboarding/control"/>
+  </ds:schemaRefs>
+</ds:datastoreItem>
+</file>
+
+<file path=customXml/itemProps45.xml><?xml version="1.0" encoding="utf-8"?>
+<ds:datastoreItem xmlns:ds="http://schemas.openxmlformats.org/officeDocument/2006/customXml" ds:itemID="{94174B8B-BA9E-488E-8243-1C7154278A05}">
+  <ds:schemaRefs>
+    <ds:schemaRef ds:uri="http://schemas.microsoft.com/VisualStudio/2011/storyboarding/control"/>
+  </ds:schemaRefs>
+</ds:datastoreItem>
+</file>
+
+<file path=customXml/itemProps46.xml><?xml version="1.0" encoding="utf-8"?>
+<ds:datastoreItem xmlns:ds="http://schemas.openxmlformats.org/officeDocument/2006/customXml" ds:itemID="{553D7197-9444-4FFE-89EF-2C68D099DABA}">
+  <ds:schemaRefs>
+    <ds:schemaRef ds:uri="http://schemas.microsoft.com/VisualStudio/2011/storyboarding/control"/>
+  </ds:schemaRefs>
+</ds:datastoreItem>
+</file>
+
+<file path=customXml/itemProps47.xml><?xml version="1.0" encoding="utf-8"?>
+<ds:datastoreItem xmlns:ds="http://schemas.openxmlformats.org/officeDocument/2006/customXml" ds:itemID="{D650F72D-7E92-4B76-972A-D5B9E6D72500}">
+  <ds:schemaRefs>
+    <ds:schemaRef ds:uri="http://schemas.microsoft.com/VisualStudio/2011/storyboarding/control"/>
+  </ds:schemaRefs>
+</ds:datastoreItem>
+</file>
+
+<file path=customXml/itemProps48.xml><?xml version="1.0" encoding="utf-8"?>
+<ds:datastoreItem xmlns:ds="http://schemas.openxmlformats.org/officeDocument/2006/customXml" ds:itemID="{91524E44-9B9E-49F4-9076-A97D3BB9990B}">
+  <ds:schemaRefs>
+    <ds:schemaRef ds:uri="http://schemas.microsoft.com/VisualStudio/2011/storyboarding/control"/>
+  </ds:schemaRefs>
+</ds:datastoreItem>
+</file>
+
+<file path=customXml/itemProps49.xml><?xml version="1.0" encoding="utf-8"?>
+<ds:datastoreItem xmlns:ds="http://schemas.openxmlformats.org/officeDocument/2006/customXml" ds:itemID="{21A15C70-6854-42D0-BCAE-62DE91ACCCDA}">
+  <ds:schemaRefs>
+    <ds:schemaRef ds:uri="http://schemas.microsoft.com/VisualStudio/2011/storyboarding/control"/>
+  </ds:schemaRefs>
+</ds:datastoreItem>
+</file>
+
+<file path=customXml/itemProps5.xml><?xml version="1.0" encoding="utf-8"?>
+<ds:datastoreItem xmlns:ds="http://schemas.openxmlformats.org/officeDocument/2006/customXml" ds:itemID="{1992035E-320D-4EFA-A5B6-7C12EB72A848}">
+  <ds:schemaRefs>
+    <ds:schemaRef ds:uri="http://schemas.microsoft.com/VisualStudio/2011/storyboarding/control"/>
+  </ds:schemaRefs>
+</ds:datastoreItem>
+</file>
+
+<file path=customXml/itemProps50.xml><?xml version="1.0" encoding="utf-8"?>
+<ds:datastoreItem xmlns:ds="http://schemas.openxmlformats.org/officeDocument/2006/customXml" ds:itemID="{2F9DDA08-7076-4781-841C-ED983DB64060}">
+  <ds:schemaRefs>
+    <ds:schemaRef ds:uri="http://schemas.microsoft.com/VisualStudio/2011/storyboarding/control"/>
+  </ds:schemaRefs>
+</ds:datastoreItem>
+</file>
+
+<file path=customXml/itemProps51.xml><?xml version="1.0" encoding="utf-8"?>
+<ds:datastoreItem xmlns:ds="http://schemas.openxmlformats.org/officeDocument/2006/customXml" ds:itemID="{9B82E22A-A4D9-4DEE-B0B9-E2F4B54E8154}">
+  <ds:schemaRefs>
+    <ds:schemaRef ds:uri="http://schemas.microsoft.com/VisualStudio/2011/storyboarding/control"/>
+  </ds:schemaRefs>
+</ds:datastoreItem>
+</file>
+
+<file path=customXml/itemProps6.xml><?xml version="1.0" encoding="utf-8"?>
+<ds:datastoreItem xmlns:ds="http://schemas.openxmlformats.org/officeDocument/2006/customXml" ds:itemID="{707F4863-0B48-4841-A482-D1E152083FF6}">
+  <ds:schemaRefs>
+    <ds:schemaRef ds:uri="http://schemas.microsoft.com/VisualStudio/2011/storyboarding/control"/>
+  </ds:schemaRefs>
+</ds:datastoreItem>
+</file>
+
+<file path=customXml/itemProps7.xml><?xml version="1.0" encoding="utf-8"?>
+<ds:datastoreItem xmlns:ds="http://schemas.openxmlformats.org/officeDocument/2006/customXml" ds:itemID="{E6CD4BFC-EF2C-48B1-85E7-60DC682AD850}">
+  <ds:schemaRefs>
+    <ds:schemaRef ds:uri="http://schemas.microsoft.com/VisualStudio/2011/storyboarding/control"/>
+  </ds:schemaRefs>
+</ds:datastoreItem>
+</file>
+
+<file path=customXml/itemProps8.xml><?xml version="1.0" encoding="utf-8"?>
 <ds:datastoreItem xmlns:ds="http://schemas.openxmlformats.org/officeDocument/2006/customXml" ds:itemID="{09B429EB-6507-47F9-9A91-F2DAD60786BC}">
   <ds:schemaRefs>
     <ds:schemaRef ds:uri="http://schemas.microsoft.com/VisualStudio/2011/storyboarding/control"/>
@@ -11074,162 +11059,10 @@
 </ds:datastoreItem>
 </file>
 
-<file path=customXml/itemProps38.xml><?xml version="1.0" encoding="utf-8"?>
-<ds:datastoreItem xmlns:ds="http://schemas.openxmlformats.org/officeDocument/2006/customXml" ds:itemID="{7487577C-FC1C-4261-A1A1-A767E630D48A}">
-  <ds:schemaRefs>
-    <ds:schemaRef ds:uri="http://schemas.microsoft.com/VisualStudio/2011/storyboarding/control"/>
-  </ds:schemaRefs>
-</ds:datastoreItem>
-</file>
-
-<file path=customXml/itemProps39.xml><?xml version="1.0" encoding="utf-8"?>
-<ds:datastoreItem xmlns:ds="http://schemas.openxmlformats.org/officeDocument/2006/customXml" ds:itemID="{553D7197-9444-4FFE-89EF-2C68D099DABA}">
-  <ds:schemaRefs>
-    <ds:schemaRef ds:uri="http://schemas.microsoft.com/VisualStudio/2011/storyboarding/control"/>
-  </ds:schemaRefs>
-</ds:datastoreItem>
-</file>
-
-<file path=customXml/itemProps4.xml><?xml version="1.0" encoding="utf-8"?>
-<ds:datastoreItem xmlns:ds="http://schemas.openxmlformats.org/officeDocument/2006/customXml" ds:itemID="{A81F534F-D0F6-45BD-B392-5EEEDC85C53C}">
-  <ds:schemaRefs>
-    <ds:schemaRef ds:uri="http://schemas.microsoft.com/VisualStudio/2011/storyboarding/control"/>
-  </ds:schemaRefs>
-</ds:datastoreItem>
-</file>
-
-<file path=customXml/itemProps40.xml><?xml version="1.0" encoding="utf-8"?>
+<file path=customXml/itemProps9.xml><?xml version="1.0" encoding="utf-8"?>
 <ds:datastoreItem xmlns:ds="http://schemas.openxmlformats.org/officeDocument/2006/customXml" ds:itemID="{663078B4-8D3F-4632-B6C6-52E250C987A4}">
   <ds:schemaRefs>
     <ds:schemaRef ds:uri="http://schemas.microsoft.com/VisualStudio/2011/storyboarding/control"/>
   </ds:schemaRefs>
 </ds:datastoreItem>
-</file>
-
-<file path=customXml/itemProps41.xml><?xml version="1.0" encoding="utf-8"?>
-<ds:datastoreItem xmlns:ds="http://schemas.openxmlformats.org/officeDocument/2006/customXml" ds:itemID="{F26CEECA-C66D-4F7C-A3A4-CBB09D7E6242}">
-  <ds:schemaRefs>
-    <ds:schemaRef ds:uri="http://schemas.microsoft.com/VisualStudio/2011/storyboarding/control"/>
-  </ds:schemaRefs>
-</ds:datastoreItem>
-</file>
-
-<file path=customXml/itemProps42.xml><?xml version="1.0" encoding="utf-8"?>
-<ds:datastoreItem xmlns:ds="http://schemas.openxmlformats.org/officeDocument/2006/customXml" ds:itemID="{21A15C70-6854-42D0-BCAE-62DE91ACCCDA}">
-  <ds:schemaRefs>
-    <ds:schemaRef ds:uri="http://schemas.microsoft.com/VisualStudio/2011/storyboarding/control"/>
-  </ds:schemaRefs>
-</ds:datastoreItem>
-</file>
-
-<file path=customXml/itemProps43.xml><?xml version="1.0" encoding="utf-8"?>
-<ds:datastoreItem xmlns:ds="http://schemas.openxmlformats.org/officeDocument/2006/customXml" ds:itemID="{C0C94C70-95FF-421C-A0BF-D896AEF3409B}">
-  <ds:schemaRefs>
-    <ds:schemaRef ds:uri="http://schemas.microsoft.com/VisualStudio/2011/storyboarding/control"/>
-  </ds:schemaRefs>
-</ds:datastoreItem>
-</file>
-
-<file path=customXml/itemProps44.xml><?xml version="1.0" encoding="utf-8"?>
-<ds:datastoreItem xmlns:ds="http://schemas.openxmlformats.org/officeDocument/2006/customXml" ds:itemID="{8AF5FD22-16A8-4298-B4F9-BAB0DE1AB4AE}">
-  <ds:schemaRefs>
-    <ds:schemaRef ds:uri="http://schemas.microsoft.com/VisualStudio/2011/storyboarding/control"/>
-  </ds:schemaRefs>
-</ds:datastoreItem>
-</file>
-
-<file path=customXml/itemProps45.xml><?xml version="1.0" encoding="utf-8"?>
-<ds:datastoreItem xmlns:ds="http://schemas.openxmlformats.org/officeDocument/2006/customXml" ds:itemID="{B860EFEF-77B0-4CEC-84DD-277110DFC015}">
-  <ds:schemaRefs>
-    <ds:schemaRef ds:uri="http://schemas.microsoft.com/VisualStudio/2011/storyboarding/control"/>
-  </ds:schemaRefs>
-</ds:datastoreItem>
-</file>
-
-<file path=customXml/itemProps46.xml><?xml version="1.0" encoding="utf-8"?>
-<ds:datastoreItem xmlns:ds="http://schemas.openxmlformats.org/officeDocument/2006/customXml" ds:itemID="{87171C52-2F23-46C5-A5C8-63197BF78C7C}">
-  <ds:schemaRefs>
-    <ds:schemaRef ds:uri="http://schemas.microsoft.com/VisualStudio/2011/storyboarding/control"/>
-  </ds:schemaRefs>
-</ds:datastoreItem>
-</file>
-
-<file path=customXml/itemProps47.xml><?xml version="1.0" encoding="utf-8"?>
-<ds:datastoreItem xmlns:ds="http://schemas.openxmlformats.org/officeDocument/2006/customXml" ds:itemID="{2F9DDA08-7076-4781-841C-ED983DB64060}">
-  <ds:schemaRefs>
-    <ds:schemaRef ds:uri="http://schemas.microsoft.com/VisualStudio/2011/storyboarding/control"/>
-  </ds:schemaRefs>
-</ds:datastoreItem>
-</file>
-
-<file path=customXml/itemProps48.xml><?xml version="1.0" encoding="utf-8"?>
-<ds:datastoreItem xmlns:ds="http://schemas.openxmlformats.org/officeDocument/2006/customXml" ds:itemID="{E5C74C48-2726-4B8F-97F5-6A985C7CC158}">
-  <ds:schemaRefs>
-    <ds:schemaRef ds:uri="http://schemas.microsoft.com/VisualStudio/2011/storyboarding/control"/>
-  </ds:schemaRefs>
-</ds:datastoreItem>
-</file>
-
-<file path=customXml/itemProps49.xml><?xml version="1.0" encoding="utf-8"?>
-<ds:datastoreItem xmlns:ds="http://schemas.openxmlformats.org/officeDocument/2006/customXml" ds:itemID="{8CC7D558-B2A2-4A4F-82E6-1087895837CA}">
-  <ds:schemaRefs>
-    <ds:schemaRef ds:uri="http://schemas.microsoft.com/VisualStudio/2011/storyboarding/control"/>
-  </ds:schemaRefs>
-</ds:datastoreItem>
-</file>
-
-<file path=customXml/itemProps5.xml><?xml version="1.0" encoding="utf-8"?>
-<ds:datastoreItem xmlns:ds="http://schemas.openxmlformats.org/officeDocument/2006/customXml" ds:itemID="{3362FC04-F650-4327-88A4-5A242A794C57}">
-  <ds:schemaRefs>
-    <ds:schemaRef ds:uri="http://schemas.microsoft.com/VisualStudio/2011/storyboarding/control"/>
-  </ds:schemaRefs>
-</ds:datastoreItem>
-</file>
-
-<file path=customXml/itemProps50.xml><?xml version="1.0" encoding="utf-8"?>
-<ds:datastoreItem xmlns:ds="http://schemas.openxmlformats.org/officeDocument/2006/customXml" ds:itemID="{9B82E22A-A4D9-4DEE-B0B9-E2F4B54E8154}">
-  <ds:schemaRefs>
-    <ds:schemaRef ds:uri="http://schemas.microsoft.com/VisualStudio/2011/storyboarding/control"/>
-  </ds:schemaRefs>
-</ds:datastoreItem>
-</file>
-
-<file path=customXml/itemProps51.xml><?xml version="1.0" encoding="utf-8"?>
-<ds:datastoreItem xmlns:ds="http://schemas.openxmlformats.org/officeDocument/2006/customXml" ds:itemID="{32EDC4AF-D292-4D7A-AA4E-95662EA2D514}">
-  <ds:schemaRefs>
-    <ds:schemaRef ds:uri="http://schemas.microsoft.com/VisualStudio/2011/storyboarding/control"/>
-  </ds:schemaRefs>
-</ds:datastoreItem>
-</file>
-
-<file path=customXml/itemProps6.xml><?xml version="1.0" encoding="utf-8"?>
-<ds:datastoreItem xmlns:ds="http://schemas.openxmlformats.org/officeDocument/2006/customXml" ds:itemID="{8FA24B14-FAA1-46A9-B96F-394D92AAEBC1}">
-  <ds:schemaRefs>
-    <ds:schemaRef ds:uri="http://schemas.microsoft.com/VisualStudio/2011/storyboarding/control"/>
-  </ds:schemaRefs>
-</ds:datastoreItem>
-</file>
-
-<file path=customXml/itemProps7.xml><?xml version="1.0" encoding="utf-8"?>
-<ds:datastoreItem xmlns:ds="http://schemas.openxmlformats.org/officeDocument/2006/customXml" ds:itemID="{8BEC3990-606D-4AD5-82D6-A5F07D9862F6}">
-  <ds:schemaRefs>
-    <ds:schemaRef ds:uri="http://schemas.microsoft.com/VisualStudio/2011/storyboarding/control"/>
-  </ds:schemaRefs>
-</ds:datastoreItem>
-</file>
-
-<file path=customXml/itemProps8.xml><?xml version="1.0" encoding="utf-8"?>
-<ds:datastoreItem xmlns:ds="http://schemas.openxmlformats.org/officeDocument/2006/customXml" ds:itemID="{3CD7C25F-0342-474E-BD7B-AF969A9D2426}">
-  <ds:schemaRefs>
-    <ds:schemaRef ds:uri="http://schemas.microsoft.com/VisualStudio/2011/storyboarding/control"/>
-  </ds:schemaRefs>
-</ds:datastoreItem>
-</file>
-
-<file path=customXml/itemProps9.xml><?xml version="1.0" encoding="utf-8"?>
-<ds:datastoreItem xmlns:ds="http://schemas.openxmlformats.org/officeDocument/2006/customXml" ds:itemID="{8B1E44D7-B5E4-49CD-B7C9-64F9C07ED9AB}">
-  <ds:schemaRefs>
-    <ds:schemaRef ds:uri="http://schemas.microsoft.com/VisualStudio/2011/storyboarding/control"/>
-  </ds:schemaRefs>
-</ds:datastoreItem>
 </file>
</xml_diff>